<commit_message>
Update package names in image
</commit_message>
<xml_diff>
--- a/assets/img/slides.pptx
+++ b/assets/img/slides.pptx
@@ -203,7 +203,7 @@
           <a:p>
             <a:fld id="{998EC2C6-BE2D-474B-B0E1-E48194DCF89A}" type="datetimeFigureOut">
               <a:rPr lang="en-US" smtClean="0"/>
-              <a:t>10/17/23</a:t>
+              <a:t>10/21/23</a:t>
             </a:fld>
             <a:endParaRPr lang="en-US"/>
           </a:p>
@@ -33289,7 +33289,7 @@
               </a:r>
               <a:r>
                 <a:rPr lang="en-US" sz="2000" dirty="0" err="1"/>
-                <a:t>proti</a:t>
+                <a:t>proti-iac</a:t>
               </a:r>
               <a:r>
                 <a:rPr lang="en-US" sz="2000" dirty="0"/>
@@ -33321,8 +33321,8 @@
         </p:nvSpPr>
         <p:spPr>
           <a:xfrm>
-            <a:off x="1449159" y="3359045"/>
-            <a:ext cx="2485207" cy="660219"/>
+            <a:off x="1292853" y="3359045"/>
+            <a:ext cx="2700000" cy="660219"/>
           </a:xfrm>
           <a:prstGeom prst="rect">
             <a:avLst/>
@@ -33360,7 +33360,7 @@
             </a:r>
             <a:r>
               <a:rPr lang="en-US" sz="2000" dirty="0" err="1"/>
-              <a:t>proti</a:t>
+              <a:t>proti-iac</a:t>
             </a:r>
             <a:r>
               <a:rPr lang="en-US" sz="2000" dirty="0"/>
@@ -33383,8 +33383,8 @@
         </p:nvSpPr>
         <p:spPr>
           <a:xfrm>
-            <a:off x="1449160" y="2391919"/>
-            <a:ext cx="2485207" cy="660219"/>
+            <a:off x="1292854" y="2391919"/>
+            <a:ext cx="2700000" cy="660219"/>
           </a:xfrm>
           <a:prstGeom prst="rect">
             <a:avLst/>
@@ -33422,7 +33422,7 @@
             </a:r>
             <a:r>
               <a:rPr lang="en-US" sz="2000" dirty="0" err="1"/>
-              <a:t>proti</a:t>
+              <a:t>proti-iac</a:t>
             </a:r>
             <a:r>
               <a:rPr lang="en-US" sz="2000" dirty="0"/>
@@ -33445,8 +33445,8 @@
         </p:nvSpPr>
         <p:spPr>
           <a:xfrm>
-            <a:off x="1449159" y="4326171"/>
-            <a:ext cx="2485207" cy="660219"/>
+            <a:off x="1292853" y="4326171"/>
+            <a:ext cx="2700000" cy="660219"/>
           </a:xfrm>
           <a:prstGeom prst="rect">
             <a:avLst/>
@@ -33484,7 +33484,7 @@
             </a:r>
             <a:r>
               <a:rPr lang="en-US" sz="2000" dirty="0" err="1"/>
-              <a:t>proti</a:t>
+              <a:t>proti-iac</a:t>
             </a:r>
             <a:r>
               <a:rPr lang="en-US" sz="2000" dirty="0"/>
@@ -33507,8 +33507,8 @@
         </p:nvSpPr>
         <p:spPr>
           <a:xfrm>
-            <a:off x="4850116" y="4326170"/>
-            <a:ext cx="2485207" cy="660219"/>
+            <a:off x="4748517" y="4326170"/>
+            <a:ext cx="2700000" cy="660219"/>
           </a:xfrm>
           <a:prstGeom prst="rect">
             <a:avLst/>
@@ -33546,7 +33546,7 @@
             </a:r>
             <a:r>
               <a:rPr lang="en-US" sz="2000" dirty="0" err="1"/>
-              <a:t>proti</a:t>
+              <a:t>proti-iac</a:t>
             </a:r>
             <a:r>
               <a:rPr lang="en-US" sz="2000" dirty="0"/>
@@ -33707,8 +33707,8 @@
         </p:nvSpPr>
         <p:spPr>
           <a:xfrm>
-            <a:off x="4850115" y="3359045"/>
-            <a:ext cx="2485207" cy="660219"/>
+            <a:off x="4748516" y="3359045"/>
+            <a:ext cx="2700000" cy="660219"/>
           </a:xfrm>
           <a:prstGeom prst="rect">
             <a:avLst/>
@@ -33746,7 +33746,7 @@
             </a:r>
             <a:r>
               <a:rPr lang="en-US" sz="2000" dirty="0" err="1"/>
-              <a:t>proti</a:t>
+              <a:t>proti-iac</a:t>
             </a:r>
             <a:r>
               <a:rPr lang="en-US" sz="2000" dirty="0"/>
@@ -33755,53 +33755,6 @@
           </a:p>
         </p:txBody>
       </p:sp>
-      <p:pic>
-        <p:nvPicPr>
-          <p:cNvPr id="18" name="Picture 2" descr="fast-check">
-            <a:extLst>
-              <a:ext uri="{FF2B5EF4-FFF2-40B4-BE49-F238E27FC236}">
-                <a16:creationId xmlns:a16="http://schemas.microsoft.com/office/drawing/2014/main" id="{A6A6227D-D584-2A13-E676-9FE2897E8A56}"/>
-              </a:ext>
-            </a:extLst>
-          </p:cNvPr>
-          <p:cNvPicPr>
-            <a:picLocks noChangeAspect="1" noChangeArrowheads="1"/>
-          </p:cNvPicPr>
-          <p:nvPr/>
-        </p:nvPicPr>
-        <p:blipFill>
-          <a:blip r:embed="rId3">
-            <a:extLst>
-              <a:ext uri="{28A0092B-C50C-407E-A947-70E740481C1C}">
-                <a14:useLocalDpi xmlns:a14="http://schemas.microsoft.com/office/drawing/2010/main" val="0"/>
-              </a:ext>
-            </a:extLst>
-          </a:blip>
-          <a:srcRect/>
-          <a:stretch>
-            <a:fillRect/>
-          </a:stretch>
-        </p:blipFill>
-        <p:spPr bwMode="auto">
-          <a:xfrm>
-            <a:off x="8473301" y="5321635"/>
-            <a:ext cx="2916540" cy="527023"/>
-          </a:xfrm>
-          <a:prstGeom prst="rect">
-            <a:avLst/>
-          </a:prstGeom>
-          <a:noFill/>
-          <a:extLst>
-            <a:ext uri="{909E8E84-426E-40DD-AFC4-6F175D3DCCD1}">
-              <a14:hiddenFill xmlns:a14="http://schemas.microsoft.com/office/drawing/2010/main">
-                <a:solidFill>
-                  <a:srgbClr val="FFFFFF"/>
-                </a:solidFill>
-              </a14:hiddenFill>
-            </a:ext>
-          </a:extLst>
-        </p:spPr>
-      </p:pic>
     </p:spTree>
     <p:extLst>
       <p:ext uri="{BB962C8B-B14F-4D97-AF65-F5344CB8AC3E}">

</xml_diff>